<commit_message>
Added latest version of power point
</commit_message>
<xml_diff>
--- a/documentation/Powerpoint/CNN-classifier.pptx
+++ b/documentation/Powerpoint/CNN-classifier.pptx
@@ -119,6 +119,11 @@
       </a:defRPr>
     </a:lvl9pPr>
   </p:defaultTextStyle>
+  <p:extLst>
+    <p:ext uri="{EFAFB233-063F-42B5-8137-9DF3F51BA10A}">
+      <p15:sldGuideLst xmlns:p15="http://schemas.microsoft.com/office/powerpoint/2012/main"/>
+    </p:ext>
+  </p:extLst>
 </p:presentation>
 </file>
 
@@ -308,7 +313,7 @@
           <a:p>
             <a:fld id="{4AAD347D-5ACD-4C99-B74B-A9C85AD731AF}" type="datetimeFigureOut">
               <a:rPr lang="en-US" dirty="0"/>
-              <a:t>8/23/2021</a:t>
+              <a:t>8/27/2021</a:t>
             </a:fld>
             <a:endParaRPr lang="en-US" dirty="0"/>
           </a:p>
@@ -578,7 +583,7 @@
           <a:p>
             <a:fld id="{4509A250-FF31-4206-8172-F9D3106AACB1}" type="datetimeFigureOut">
               <a:rPr lang="en-US" dirty="0"/>
-              <a:t>8/23/2021</a:t>
+              <a:t>8/27/2021</a:t>
             </a:fld>
             <a:endParaRPr lang="en-US" dirty="0"/>
           </a:p>
@@ -767,7 +772,7 @@
           <a:p>
             <a:fld id="{4509A250-FF31-4206-8172-F9D3106AACB1}" type="datetimeFigureOut">
               <a:rPr lang="en-US" dirty="0"/>
-              <a:t>8/23/2021</a:t>
+              <a:t>8/27/2021</a:t>
             </a:fld>
             <a:endParaRPr lang="en-US" dirty="0"/>
           </a:p>
@@ -1035,7 +1040,7 @@
           <a:p>
             <a:fld id="{4509A250-FF31-4206-8172-F9D3106AACB1}" type="datetimeFigureOut">
               <a:rPr lang="en-US" dirty="0"/>
-              <a:t>8/23/2021</a:t>
+              <a:t>8/27/2021</a:t>
             </a:fld>
             <a:endParaRPr lang="en-US" dirty="0"/>
           </a:p>
@@ -1371,7 +1376,7 @@
           <a:p>
             <a:fld id="{4509A250-FF31-4206-8172-F9D3106AACB1}" type="datetimeFigureOut">
               <a:rPr lang="en-US" dirty="0"/>
-              <a:t>8/23/2021</a:t>
+              <a:t>8/27/2021</a:t>
             </a:fld>
             <a:endParaRPr lang="en-US" dirty="0"/>
           </a:p>
@@ -1989,7 +1994,7 @@
           <a:p>
             <a:fld id="{4509A250-FF31-4206-8172-F9D3106AACB1}" type="datetimeFigureOut">
               <a:rPr lang="en-US" dirty="0"/>
-              <a:t>8/23/2021</a:t>
+              <a:t>8/27/2021</a:t>
             </a:fld>
             <a:endParaRPr lang="en-US" dirty="0"/>
           </a:p>
@@ -2844,7 +2849,7 @@
           <a:p>
             <a:fld id="{4509A250-FF31-4206-8172-F9D3106AACB1}" type="datetimeFigureOut">
               <a:rPr lang="en-US" dirty="0"/>
-              <a:t>8/23/2021</a:t>
+              <a:t>8/27/2021</a:t>
             </a:fld>
             <a:endParaRPr lang="en-US" dirty="0"/>
           </a:p>
@@ -3009,7 +3014,7 @@
           <a:p>
             <a:fld id="{4509A250-FF31-4206-8172-F9D3106AACB1}" type="datetimeFigureOut">
               <a:rPr lang="en-US" dirty="0"/>
-              <a:t>8/23/2021</a:t>
+              <a:t>8/27/2021</a:t>
             </a:fld>
             <a:endParaRPr lang="en-US" dirty="0"/>
           </a:p>
@@ -3184,7 +3189,7 @@
           <a:p>
             <a:fld id="{4509A250-FF31-4206-8172-F9D3106AACB1}" type="datetimeFigureOut">
               <a:rPr lang="en-US" dirty="0"/>
-              <a:t>8/23/2021</a:t>
+              <a:t>8/27/2021</a:t>
             </a:fld>
             <a:endParaRPr lang="en-US" dirty="0"/>
           </a:p>
@@ -3349,7 +3354,7 @@
           <a:p>
             <a:fld id="{4509A250-FF31-4206-8172-F9D3106AACB1}" type="datetimeFigureOut">
               <a:rPr lang="en-US" dirty="0"/>
-              <a:t>8/23/2021</a:t>
+              <a:t>8/27/2021</a:t>
             </a:fld>
             <a:endParaRPr lang="en-US" dirty="0"/>
           </a:p>
@@ -3591,7 +3596,7 @@
           <a:p>
             <a:fld id="{9796027F-7875-4030-9381-8BD8C4F21935}" type="datetimeFigureOut">
               <a:rPr lang="en-US" dirty="0"/>
-              <a:t>8/23/2021</a:t>
+              <a:t>8/27/2021</a:t>
             </a:fld>
             <a:endParaRPr lang="en-US" dirty="0"/>
           </a:p>
@@ -3878,7 +3883,7 @@
           <a:p>
             <a:fld id="{9796027F-7875-4030-9381-8BD8C4F21935}" type="datetimeFigureOut">
               <a:rPr lang="en-US" dirty="0"/>
-              <a:t>8/23/2021</a:t>
+              <a:t>8/27/2021</a:t>
             </a:fld>
             <a:endParaRPr lang="en-US" dirty="0"/>
           </a:p>
@@ -4317,7 +4322,7 @@
           <a:p>
             <a:fld id="{9796027F-7875-4030-9381-8BD8C4F21935}" type="datetimeFigureOut">
               <a:rPr lang="en-US" dirty="0"/>
-              <a:t>8/23/2021</a:t>
+              <a:t>8/27/2021</a:t>
             </a:fld>
             <a:endParaRPr lang="en-US" dirty="0"/>
           </a:p>
@@ -4430,7 +4435,7 @@
           <a:p>
             <a:fld id="{4509A250-FF31-4206-8172-F9D3106AACB1}" type="datetimeFigureOut">
               <a:rPr lang="en-US" dirty="0"/>
-              <a:t>8/23/2021</a:t>
+              <a:t>8/27/2021</a:t>
             </a:fld>
             <a:endParaRPr lang="en-US" dirty="0"/>
           </a:p>
@@ -4520,7 +4525,7 @@
           <a:p>
             <a:fld id="{4509A250-FF31-4206-8172-F9D3106AACB1}" type="datetimeFigureOut">
               <a:rPr lang="en-US" dirty="0"/>
-              <a:t>8/23/2021</a:t>
+              <a:t>8/27/2021</a:t>
             </a:fld>
             <a:endParaRPr lang="en-US" dirty="0"/>
           </a:p>
@@ -4794,7 +4799,7 @@
           <a:p>
             <a:fld id="{4509A250-FF31-4206-8172-F9D3106AACB1}" type="datetimeFigureOut">
               <a:rPr lang="en-US" dirty="0"/>
-              <a:t>8/23/2021</a:t>
+              <a:t>8/27/2021</a:t>
             </a:fld>
             <a:endParaRPr lang="en-US" dirty="0"/>
           </a:p>
@@ -5064,7 +5069,7 @@
           <a:p>
             <a:fld id="{4509A250-FF31-4206-8172-F9D3106AACB1}" type="datetimeFigureOut">
               <a:rPr lang="en-US" dirty="0"/>
-              <a:t>8/23/2021</a:t>
+              <a:t>8/27/2021</a:t>
             </a:fld>
             <a:endParaRPr lang="en-US" dirty="0"/>
           </a:p>
@@ -5488,7 +5493,7 @@
           <a:p>
             <a:fld id="{4AAD347D-5ACD-4C99-B74B-A9C85AD731AF}" type="datetimeFigureOut">
               <a:rPr lang="en-US" dirty="0"/>
-              <a:t>8/23/2021</a:t>
+              <a:t>8/27/2021</a:t>
             </a:fld>
             <a:endParaRPr lang="en-US" dirty="0"/>
           </a:p>
@@ -7029,7 +7034,7 @@
           <a:p>
             <a:pPr algn="ctr"/>
             <a:r>
-              <a:rPr lang="sv-SE" sz="2400">
+              <a:rPr lang="sv-SE" sz="2400" dirty="0">
                 <a:solidFill>
                   <a:schemeClr val="bg2"/>
                 </a:solidFill>
@@ -8264,7 +8269,7 @@
         <p:spPr>
           <a:xfrm>
             <a:off x="1200716" y="3294370"/>
-            <a:ext cx="8850118" cy="1477328"/>
+            <a:ext cx="8850118" cy="2585323"/>
           </a:xfrm>
           <a:prstGeom prst="rect">
             <a:avLst/>
@@ -8336,6 +8341,46 @@
               <a:rPr lang="sv-SE" dirty="0"/>
               <a:t>”</a:t>
             </a:r>
+          </a:p>
+          <a:p>
+            <a:pPr marL="285750" indent="-285750">
+              <a:buFont typeface="Arial" panose="020B0604020202020204" pitchFamily="34" charset="0"/>
+              <a:buChar char="•"/>
+            </a:pPr>
+            <a:endParaRPr lang="sv-SE" dirty="0"/>
+          </a:p>
+          <a:p>
+            <a:pPr marL="285750" indent="-285750">
+              <a:buFont typeface="Arial" panose="020B0604020202020204" pitchFamily="34" charset="0"/>
+              <a:buChar char="•"/>
+            </a:pPr>
+            <a:r>
+              <a:rPr lang="sv-SE" dirty="0"/>
+              <a:t>Använda ”</a:t>
+            </a:r>
+            <a:r>
+              <a:rPr lang="sv-SE" dirty="0" err="1"/>
+              <a:t>validation</a:t>
+            </a:r>
+            <a:r>
+              <a:rPr lang="sv-SE" dirty="0"/>
+              <a:t> data” och ”callbacks” under träningen, minskar risken för ”</a:t>
+            </a:r>
+            <a:r>
+              <a:rPr lang="sv-SE" dirty="0" err="1"/>
+              <a:t>overfitting</a:t>
+            </a:r>
+            <a:r>
+              <a:rPr lang="sv-SE" dirty="0"/>
+              <a:t>”</a:t>
+            </a:r>
+          </a:p>
+          <a:p>
+            <a:pPr marL="285750" indent="-285750">
+              <a:buFont typeface="Arial" panose="020B0604020202020204" pitchFamily="34" charset="0"/>
+              <a:buChar char="•"/>
+            </a:pPr>
+            <a:endParaRPr lang="sv-SE" dirty="0"/>
           </a:p>
         </p:txBody>
       </p:sp>
@@ -17048,7 +17093,7 @@
         </p:nvSpPr>
         <p:spPr>
           <a:xfrm>
-            <a:off x="1181732" y="3099607"/>
+            <a:off x="609277" y="3088040"/>
             <a:ext cx="9828535" cy="2775055"/>
           </a:xfrm>
           <a:prstGeom prst="rect">
@@ -17136,6 +17181,102 @@
           </a:p>
         </p:txBody>
       </p:sp>
+      <p:pic>
+        <p:nvPicPr>
+          <p:cNvPr id="5" name="Bildobjekt 4">
+            <a:extLst>
+              <a:ext uri="{FF2B5EF4-FFF2-40B4-BE49-F238E27FC236}">
+                <a16:creationId xmlns:a16="http://schemas.microsoft.com/office/drawing/2014/main" id="{8BE29FF1-0D6C-49A4-8DBF-20997B4B0838}"/>
+              </a:ext>
+            </a:extLst>
+          </p:cNvPr>
+          <p:cNvPicPr>
+            <a:picLocks noChangeAspect="1"/>
+          </p:cNvPicPr>
+          <p:nvPr/>
+        </p:nvPicPr>
+        <p:blipFill>
+          <a:blip r:embed="rId2"/>
+          <a:stretch>
+            <a:fillRect/>
+          </a:stretch>
+        </p:blipFill>
+        <p:spPr>
+          <a:xfrm>
+            <a:off x="9959448" y="5402650"/>
+            <a:ext cx="956728" cy="1166876"/>
+          </a:xfrm>
+          <a:prstGeom prst="rect">
+            <a:avLst/>
+          </a:prstGeom>
+        </p:spPr>
+      </p:pic>
+      <p:pic>
+        <p:nvPicPr>
+          <p:cNvPr id="7" name="Bildobjekt 6" descr="En bild som visar text, tecken&#10;&#10;Automatiskt genererad beskrivning">
+            <a:extLst>
+              <a:ext uri="{FF2B5EF4-FFF2-40B4-BE49-F238E27FC236}">
+                <a16:creationId xmlns:a16="http://schemas.microsoft.com/office/drawing/2014/main" id="{8D726BB6-CC28-4D2B-80BD-E0ECC6776003}"/>
+              </a:ext>
+            </a:extLst>
+          </p:cNvPr>
+          <p:cNvPicPr>
+            <a:picLocks noChangeAspect="1"/>
+          </p:cNvPicPr>
+          <p:nvPr/>
+        </p:nvPicPr>
+        <p:blipFill>
+          <a:blip r:embed="rId3"/>
+          <a:stretch>
+            <a:fillRect/>
+          </a:stretch>
+        </p:blipFill>
+        <p:spPr>
+          <a:xfrm>
+            <a:off x="9260645" y="2759200"/>
+            <a:ext cx="2645765" cy="1410808"/>
+          </a:xfrm>
+          <a:prstGeom prst="rect">
+            <a:avLst/>
+          </a:prstGeom>
+        </p:spPr>
+      </p:pic>
+      <p:pic>
+        <p:nvPicPr>
+          <p:cNvPr id="11" name="Bild 10" descr="Pil: vänd vänster med hel fyllning">
+            <a:extLst>
+              <a:ext uri="{FF2B5EF4-FFF2-40B4-BE49-F238E27FC236}">
+                <a16:creationId xmlns:a16="http://schemas.microsoft.com/office/drawing/2014/main" id="{06BFA432-BF8B-4BF8-8EF2-3C177F56C299}"/>
+              </a:ext>
+            </a:extLst>
+          </p:cNvPr>
+          <p:cNvPicPr>
+            <a:picLocks noChangeAspect="1"/>
+          </p:cNvPicPr>
+          <p:nvPr/>
+        </p:nvPicPr>
+        <p:blipFill>
+          <a:blip r:embed="rId4">
+            <a:extLst>
+              <a:ext uri="{96DAC541-7B7A-43D3-8B79-37D633B846F1}">
+                <asvg:svgBlip xmlns:asvg="http://schemas.microsoft.com/office/drawing/2016/SVG/main" r:embed="rId5"/>
+              </a:ext>
+            </a:extLst>
+          </a:blip>
+          <a:stretch>
+            <a:fillRect/>
+          </a:stretch>
+        </p:blipFill>
+        <p:spPr>
+          <a:xfrm>
+            <a:off x="10126327" y="4388439"/>
+            <a:ext cx="914400" cy="914400"/>
+          </a:xfrm>
+          <a:prstGeom prst="rect">
+            <a:avLst/>
+          </a:prstGeom>
+        </p:spPr>
+      </p:pic>
     </p:spTree>
     <p:extLst>
       <p:ext uri="{BB962C8B-B14F-4D97-AF65-F5344CB8AC3E}">
@@ -18404,6 +18545,96 @@
           </a:p>
         </p:txBody>
       </p:sp>
+      <p:pic>
+        <p:nvPicPr>
+          <p:cNvPr id="4" name="Bildobjekt 3">
+            <a:extLst>
+              <a:ext uri="{FF2B5EF4-FFF2-40B4-BE49-F238E27FC236}">
+                <a16:creationId xmlns:a16="http://schemas.microsoft.com/office/drawing/2014/main" id="{8B13695C-CF7A-4AEC-AE4C-C99D01D746A5}"/>
+              </a:ext>
+            </a:extLst>
+          </p:cNvPr>
+          <p:cNvPicPr>
+            <a:picLocks noChangeAspect="1"/>
+          </p:cNvPicPr>
+          <p:nvPr/>
+        </p:nvPicPr>
+        <p:blipFill>
+          <a:blip r:embed="rId2"/>
+          <a:stretch>
+            <a:fillRect/>
+          </a:stretch>
+        </p:blipFill>
+        <p:spPr>
+          <a:xfrm>
+            <a:off x="7538816" y="2504288"/>
+            <a:ext cx="1039152" cy="1111027"/>
+          </a:xfrm>
+          <a:prstGeom prst="rect">
+            <a:avLst/>
+          </a:prstGeom>
+        </p:spPr>
+      </p:pic>
+      <p:pic>
+        <p:nvPicPr>
+          <p:cNvPr id="6" name="Bildobjekt 5">
+            <a:extLst>
+              <a:ext uri="{FF2B5EF4-FFF2-40B4-BE49-F238E27FC236}">
+                <a16:creationId xmlns:a16="http://schemas.microsoft.com/office/drawing/2014/main" id="{A55F87D9-95D7-424A-955F-BC74D41C9262}"/>
+              </a:ext>
+            </a:extLst>
+          </p:cNvPr>
+          <p:cNvPicPr>
+            <a:picLocks noChangeAspect="1"/>
+          </p:cNvPicPr>
+          <p:nvPr/>
+        </p:nvPicPr>
+        <p:blipFill>
+          <a:blip r:embed="rId3"/>
+          <a:stretch>
+            <a:fillRect/>
+          </a:stretch>
+        </p:blipFill>
+        <p:spPr>
+          <a:xfrm>
+            <a:off x="8832797" y="3860248"/>
+            <a:ext cx="1034988" cy="1034988"/>
+          </a:xfrm>
+          <a:prstGeom prst="rect">
+            <a:avLst/>
+          </a:prstGeom>
+        </p:spPr>
+      </p:pic>
+      <p:pic>
+        <p:nvPicPr>
+          <p:cNvPr id="9" name="Bildobjekt 8">
+            <a:extLst>
+              <a:ext uri="{FF2B5EF4-FFF2-40B4-BE49-F238E27FC236}">
+                <a16:creationId xmlns:a16="http://schemas.microsoft.com/office/drawing/2014/main" id="{4C35BA11-9CCA-4E73-ACAB-F8C0FD014C96}"/>
+              </a:ext>
+            </a:extLst>
+          </p:cNvPr>
+          <p:cNvPicPr>
+            <a:picLocks noChangeAspect="1"/>
+          </p:cNvPicPr>
+          <p:nvPr/>
+        </p:nvPicPr>
+        <p:blipFill>
+          <a:blip r:embed="rId4"/>
+          <a:stretch>
+            <a:fillRect/>
+          </a:stretch>
+        </p:blipFill>
+        <p:spPr>
+          <a:xfrm>
+            <a:off x="9893825" y="5397770"/>
+            <a:ext cx="1087973" cy="942726"/>
+          </a:xfrm>
+          <a:prstGeom prst="rect">
+            <a:avLst/>
+          </a:prstGeom>
+        </p:spPr>
+      </p:pic>
     </p:spTree>
     <p:extLst>
       <p:ext uri="{BB962C8B-B14F-4D97-AF65-F5344CB8AC3E}">

</xml_diff>